<commit_message>
update diagram and intro
</commit_message>
<xml_diff>
--- a/PLMfamily.pptx
+++ b/PLMfamily.pptx
@@ -259,7 +259,7 @@
           <a:p>
             <a:fld id="{3DD3760A-DE7A-43C9-AD8E-27ED0E105739}" type="datetimeFigureOut">
               <a:rPr lang="zh-CN" altLang="en-US" smtClean="0"/>
-              <a:t>2019/9/26</a:t>
+              <a:t>2019/9/27</a:t>
             </a:fld>
             <a:endParaRPr lang="zh-CN" altLang="en-US"/>
           </a:p>
@@ -457,7 +457,7 @@
           <a:p>
             <a:fld id="{3DD3760A-DE7A-43C9-AD8E-27ED0E105739}" type="datetimeFigureOut">
               <a:rPr lang="zh-CN" altLang="en-US" smtClean="0"/>
-              <a:t>2019/9/26</a:t>
+              <a:t>2019/9/27</a:t>
             </a:fld>
             <a:endParaRPr lang="zh-CN" altLang="en-US"/>
           </a:p>
@@ -665,7 +665,7 @@
           <a:p>
             <a:fld id="{3DD3760A-DE7A-43C9-AD8E-27ED0E105739}" type="datetimeFigureOut">
               <a:rPr lang="zh-CN" altLang="en-US" smtClean="0"/>
-              <a:t>2019/9/26</a:t>
+              <a:t>2019/9/27</a:t>
             </a:fld>
             <a:endParaRPr lang="zh-CN" altLang="en-US"/>
           </a:p>
@@ -863,7 +863,7 @@
           <a:p>
             <a:fld id="{3DD3760A-DE7A-43C9-AD8E-27ED0E105739}" type="datetimeFigureOut">
               <a:rPr lang="zh-CN" altLang="en-US" smtClean="0"/>
-              <a:t>2019/9/26</a:t>
+              <a:t>2019/9/27</a:t>
             </a:fld>
             <a:endParaRPr lang="zh-CN" altLang="en-US"/>
           </a:p>
@@ -1138,7 +1138,7 @@
           <a:p>
             <a:fld id="{3DD3760A-DE7A-43C9-AD8E-27ED0E105739}" type="datetimeFigureOut">
               <a:rPr lang="zh-CN" altLang="en-US" smtClean="0"/>
-              <a:t>2019/9/26</a:t>
+              <a:t>2019/9/27</a:t>
             </a:fld>
             <a:endParaRPr lang="zh-CN" altLang="en-US"/>
           </a:p>
@@ -1403,7 +1403,7 @@
           <a:p>
             <a:fld id="{3DD3760A-DE7A-43C9-AD8E-27ED0E105739}" type="datetimeFigureOut">
               <a:rPr lang="zh-CN" altLang="en-US" smtClean="0"/>
-              <a:t>2019/9/26</a:t>
+              <a:t>2019/9/27</a:t>
             </a:fld>
             <a:endParaRPr lang="zh-CN" altLang="en-US"/>
           </a:p>
@@ -1815,7 +1815,7 @@
           <a:p>
             <a:fld id="{3DD3760A-DE7A-43C9-AD8E-27ED0E105739}" type="datetimeFigureOut">
               <a:rPr lang="zh-CN" altLang="en-US" smtClean="0"/>
-              <a:t>2019/9/26</a:t>
+              <a:t>2019/9/27</a:t>
             </a:fld>
             <a:endParaRPr lang="zh-CN" altLang="en-US"/>
           </a:p>
@@ -1956,7 +1956,7 @@
           <a:p>
             <a:fld id="{3DD3760A-DE7A-43C9-AD8E-27ED0E105739}" type="datetimeFigureOut">
               <a:rPr lang="zh-CN" altLang="en-US" smtClean="0"/>
-              <a:t>2019/9/26</a:t>
+              <a:t>2019/9/27</a:t>
             </a:fld>
             <a:endParaRPr lang="zh-CN" altLang="en-US"/>
           </a:p>
@@ -2069,7 +2069,7 @@
           <a:p>
             <a:fld id="{3DD3760A-DE7A-43C9-AD8E-27ED0E105739}" type="datetimeFigureOut">
               <a:rPr lang="zh-CN" altLang="en-US" smtClean="0"/>
-              <a:t>2019/9/26</a:t>
+              <a:t>2019/9/27</a:t>
             </a:fld>
             <a:endParaRPr lang="zh-CN" altLang="en-US"/>
           </a:p>
@@ -2380,7 +2380,7 @@
           <a:p>
             <a:fld id="{3DD3760A-DE7A-43C9-AD8E-27ED0E105739}" type="datetimeFigureOut">
               <a:rPr lang="zh-CN" altLang="en-US" smtClean="0"/>
-              <a:t>2019/9/26</a:t>
+              <a:t>2019/9/27</a:t>
             </a:fld>
             <a:endParaRPr lang="zh-CN" altLang="en-US"/>
           </a:p>
@@ -2668,7 +2668,7 @@
           <a:p>
             <a:fld id="{3DD3760A-DE7A-43C9-AD8E-27ED0E105739}" type="datetimeFigureOut">
               <a:rPr lang="zh-CN" altLang="en-US" smtClean="0"/>
-              <a:t>2019/9/26</a:t>
+              <a:t>2019/9/27</a:t>
             </a:fld>
             <a:endParaRPr lang="zh-CN" altLang="en-US"/>
           </a:p>
@@ -2909,7 +2909,7 @@
           <a:p>
             <a:fld id="{3DD3760A-DE7A-43C9-AD8E-27ED0E105739}" type="datetimeFigureOut">
               <a:rPr lang="zh-CN" altLang="en-US" smtClean="0"/>
-              <a:t>2019/9/26</a:t>
+              <a:t>2019/9/27</a:t>
             </a:fld>
             <a:endParaRPr lang="zh-CN" altLang="en-US"/>
           </a:p>
@@ -5871,6 +5871,48 @@
           </a:prstGeom>
         </p:spPr>
       </p:pic>
+      <p:sp>
+        <p:nvSpPr>
+          <p:cNvPr id="2" name="文本框 1">
+            <a:extLst>
+              <a:ext uri="{FF2B5EF4-FFF2-40B4-BE49-F238E27FC236}">
+                <a16:creationId xmlns:a16="http://schemas.microsoft.com/office/drawing/2014/main" id="{19BB2FCF-9087-4E65-BD0B-A0B6E84F3743}"/>
+              </a:ext>
+            </a:extLst>
+          </p:cNvPr>
+          <p:cNvSpPr txBox="1"/>
+          <p:nvPr/>
+        </p:nvSpPr>
+        <p:spPr>
+          <a:xfrm>
+            <a:off x="9278463" y="6585512"/>
+            <a:ext cx="3072666" cy="253916"/>
+          </a:xfrm>
+          <a:prstGeom prst="rect">
+            <a:avLst/>
+          </a:prstGeom>
+          <a:noFill/>
+        </p:spPr>
+        <p:txBody>
+          <a:bodyPr wrap="square" rtlCol="0">
+            <a:spAutoFit/>
+          </a:bodyPr>
+          <a:lstStyle/>
+          <a:p>
+            <a:r>
+              <a:rPr lang="en-US" altLang="zh-CN" sz="1050" dirty="0">
+                <a:latin typeface="Times New Roman" panose="02020603050405020304" pitchFamily="18" charset="0"/>
+                <a:cs typeface="Times New Roman" panose="02020603050405020304" pitchFamily="18" charset="0"/>
+              </a:rPr>
+              <a:t> By Xiaozhi Wang &amp; Zhengyan Zhang @THUNLP</a:t>
+            </a:r>
+            <a:endParaRPr lang="zh-CN" altLang="en-US" sz="1050" dirty="0">
+              <a:latin typeface="Times New Roman" panose="02020603050405020304" pitchFamily="18" charset="0"/>
+              <a:cs typeface="Times New Roman" panose="02020603050405020304" pitchFamily="18" charset="0"/>
+            </a:endParaRPr>
+          </a:p>
+        </p:txBody>
+      </p:sp>
     </p:spTree>
     <p:extLst>
       <p:ext uri="{BB962C8B-B14F-4D97-AF65-F5344CB8AC3E}">

</xml_diff>

<commit_message>
update UNITER & HUBERT
</commit_message>
<xml_diff>
--- a/PLMfamily.pptx
+++ b/PLMfamily.pptx
@@ -259,7 +259,7 @@
           <a:p>
             <a:fld id="{3DD3760A-DE7A-43C9-AD8E-27ED0E105739}" type="datetimeFigureOut">
               <a:rPr lang="zh-CN" altLang="en-US" smtClean="0"/>
-              <a:t>2019/9/27</a:t>
+              <a:t>2019/9/28</a:t>
             </a:fld>
             <a:endParaRPr lang="zh-CN" altLang="en-US"/>
           </a:p>
@@ -457,7 +457,7 @@
           <a:p>
             <a:fld id="{3DD3760A-DE7A-43C9-AD8E-27ED0E105739}" type="datetimeFigureOut">
               <a:rPr lang="zh-CN" altLang="en-US" smtClean="0"/>
-              <a:t>2019/9/27</a:t>
+              <a:t>2019/9/28</a:t>
             </a:fld>
             <a:endParaRPr lang="zh-CN" altLang="en-US"/>
           </a:p>
@@ -665,7 +665,7 @@
           <a:p>
             <a:fld id="{3DD3760A-DE7A-43C9-AD8E-27ED0E105739}" type="datetimeFigureOut">
               <a:rPr lang="zh-CN" altLang="en-US" smtClean="0"/>
-              <a:t>2019/9/27</a:t>
+              <a:t>2019/9/28</a:t>
             </a:fld>
             <a:endParaRPr lang="zh-CN" altLang="en-US"/>
           </a:p>
@@ -863,7 +863,7 @@
           <a:p>
             <a:fld id="{3DD3760A-DE7A-43C9-AD8E-27ED0E105739}" type="datetimeFigureOut">
               <a:rPr lang="zh-CN" altLang="en-US" smtClean="0"/>
-              <a:t>2019/9/27</a:t>
+              <a:t>2019/9/28</a:t>
             </a:fld>
             <a:endParaRPr lang="zh-CN" altLang="en-US"/>
           </a:p>
@@ -1138,7 +1138,7 @@
           <a:p>
             <a:fld id="{3DD3760A-DE7A-43C9-AD8E-27ED0E105739}" type="datetimeFigureOut">
               <a:rPr lang="zh-CN" altLang="en-US" smtClean="0"/>
-              <a:t>2019/9/27</a:t>
+              <a:t>2019/9/28</a:t>
             </a:fld>
             <a:endParaRPr lang="zh-CN" altLang="en-US"/>
           </a:p>
@@ -1403,7 +1403,7 @@
           <a:p>
             <a:fld id="{3DD3760A-DE7A-43C9-AD8E-27ED0E105739}" type="datetimeFigureOut">
               <a:rPr lang="zh-CN" altLang="en-US" smtClean="0"/>
-              <a:t>2019/9/27</a:t>
+              <a:t>2019/9/28</a:t>
             </a:fld>
             <a:endParaRPr lang="zh-CN" altLang="en-US"/>
           </a:p>
@@ -1815,7 +1815,7 @@
           <a:p>
             <a:fld id="{3DD3760A-DE7A-43C9-AD8E-27ED0E105739}" type="datetimeFigureOut">
               <a:rPr lang="zh-CN" altLang="en-US" smtClean="0"/>
-              <a:t>2019/9/27</a:t>
+              <a:t>2019/9/28</a:t>
             </a:fld>
             <a:endParaRPr lang="zh-CN" altLang="en-US"/>
           </a:p>
@@ -1956,7 +1956,7 @@
           <a:p>
             <a:fld id="{3DD3760A-DE7A-43C9-AD8E-27ED0E105739}" type="datetimeFigureOut">
               <a:rPr lang="zh-CN" altLang="en-US" smtClean="0"/>
-              <a:t>2019/9/27</a:t>
+              <a:t>2019/9/28</a:t>
             </a:fld>
             <a:endParaRPr lang="zh-CN" altLang="en-US"/>
           </a:p>
@@ -2069,7 +2069,7 @@
           <a:p>
             <a:fld id="{3DD3760A-DE7A-43C9-AD8E-27ED0E105739}" type="datetimeFigureOut">
               <a:rPr lang="zh-CN" altLang="en-US" smtClean="0"/>
-              <a:t>2019/9/27</a:t>
+              <a:t>2019/9/28</a:t>
             </a:fld>
             <a:endParaRPr lang="zh-CN" altLang="en-US"/>
           </a:p>
@@ -2380,7 +2380,7 @@
           <a:p>
             <a:fld id="{3DD3760A-DE7A-43C9-AD8E-27ED0E105739}" type="datetimeFigureOut">
               <a:rPr lang="zh-CN" altLang="en-US" smtClean="0"/>
-              <a:t>2019/9/27</a:t>
+              <a:t>2019/9/28</a:t>
             </a:fld>
             <a:endParaRPr lang="zh-CN" altLang="en-US"/>
           </a:p>
@@ -2668,7 +2668,7 @@
           <a:p>
             <a:fld id="{3DD3760A-DE7A-43C9-AD8E-27ED0E105739}" type="datetimeFigureOut">
               <a:rPr lang="zh-CN" altLang="en-US" smtClean="0"/>
-              <a:t>2019/9/27</a:t>
+              <a:t>2019/9/28</a:t>
             </a:fld>
             <a:endParaRPr lang="zh-CN" altLang="en-US"/>
           </a:p>
@@ -2909,7 +2909,7 @@
           <a:p>
             <a:fld id="{3DD3760A-DE7A-43C9-AD8E-27ED0E105739}" type="datetimeFigureOut">
               <a:rPr lang="zh-CN" altLang="en-US" smtClean="0"/>
-              <a:t>2019/9/27</a:t>
+              <a:t>2019/9/28</a:t>
             </a:fld>
             <a:endParaRPr lang="zh-CN" altLang="en-US"/>
           </a:p>
@@ -4228,15 +4228,15 @@
             </a:extLst>
           </p:cNvPr>
           <p:cNvCxnSpPr>
-            <a:stCxn id="15" idx="2"/>
+            <a:cxnSpLocks/>
             <a:endCxn id="35" idx="0"/>
           </p:cNvCxnSpPr>
           <p:nvPr/>
         </p:nvCxnSpPr>
         <p:spPr>
           <a:xfrm>
-            <a:off x="5657165" y="2490670"/>
-            <a:ext cx="615536" cy="1527497"/>
+            <a:off x="5807034" y="2490670"/>
+            <a:ext cx="465667" cy="1527497"/>
           </a:xfrm>
           <a:prstGeom prst="straightConnector1">
             <a:avLst/>
@@ -4517,7 +4517,7 @@
         </p:nvSpPr>
         <p:spPr>
           <a:xfrm>
-            <a:off x="7693083" y="4419407"/>
+            <a:off x="7606258" y="4070997"/>
             <a:ext cx="1701331" cy="2585323"/>
           </a:xfrm>
           <a:prstGeom prst="rect">
@@ -4635,6 +4635,13 @@
           </a:p>
           <a:p>
             <a:pPr algn="ctr"/>
+            <a:r>
+              <a:rPr lang="en-US" altLang="zh-CN" b="1" dirty="0">
+                <a:latin typeface="Times New Roman" panose="02020603050405020304" pitchFamily="18" charset="0"/>
+                <a:cs typeface="Times New Roman" panose="02020603050405020304" pitchFamily="18" charset="0"/>
+              </a:rPr>
+              <a:t>UNITER</a:t>
+            </a:r>
             <a:endParaRPr lang="zh-CN" altLang="en-US" b="1" dirty="0">
               <a:latin typeface="Times New Roman" panose="02020603050405020304" pitchFamily="18" charset="0"/>
               <a:cs typeface="Times New Roman" panose="02020603050405020304" pitchFamily="18" charset="0"/>
@@ -4653,14 +4660,13 @@
           </p:cNvPr>
           <p:cNvCxnSpPr>
             <a:cxnSpLocks/>
-            <a:endCxn id="58" idx="0"/>
           </p:cNvCxnSpPr>
           <p:nvPr/>
         </p:nvCxnSpPr>
         <p:spPr>
           <a:xfrm>
             <a:off x="5964933" y="2229675"/>
-            <a:ext cx="2578816" cy="2189732"/>
+            <a:ext cx="2450096" cy="1851258"/>
           </a:xfrm>
           <a:prstGeom prst="straightConnector1">
             <a:avLst/>
@@ -4698,7 +4704,7 @@
         </p:nvSpPr>
         <p:spPr>
           <a:xfrm>
-            <a:off x="7140729" y="3508063"/>
+            <a:off x="6970911" y="3205616"/>
             <a:ext cx="1221865" cy="307777"/>
           </a:xfrm>
           <a:prstGeom prst="rect">
@@ -4935,8 +4941,8 @@
         </p:nvCxnSpPr>
         <p:spPr>
           <a:xfrm flipH="1">
-            <a:off x="4857617" y="2490670"/>
-            <a:ext cx="637426" cy="2850692"/>
+            <a:off x="4857617" y="2537452"/>
+            <a:ext cx="713450" cy="2803910"/>
           </a:xfrm>
           <a:prstGeom prst="straightConnector1">
             <a:avLst/>
@@ -4974,7 +4980,7 @@
         </p:nvSpPr>
         <p:spPr>
           <a:xfrm>
-            <a:off x="4613146" y="3580702"/>
+            <a:off x="4578550" y="3606013"/>
             <a:ext cx="1414867" cy="738664"/>
           </a:xfrm>
           <a:prstGeom prst="rect">

</xml_diff>

<commit_message>
add MultiFiT, close #4
</commit_message>
<xml_diff>
--- a/PLMfamily.pptx
+++ b/PLMfamily.pptx
@@ -259,7 +259,7 @@
           <a:p>
             <a:fld id="{3DD3760A-DE7A-43C9-AD8E-27ED0E105739}" type="datetimeFigureOut">
               <a:rPr lang="zh-CN" altLang="en-US" smtClean="0"/>
-              <a:t>2019/9/28</a:t>
+              <a:t>2019/10/7</a:t>
             </a:fld>
             <a:endParaRPr lang="zh-CN" altLang="en-US"/>
           </a:p>
@@ -457,7 +457,7 @@
           <a:p>
             <a:fld id="{3DD3760A-DE7A-43C9-AD8E-27ED0E105739}" type="datetimeFigureOut">
               <a:rPr lang="zh-CN" altLang="en-US" smtClean="0"/>
-              <a:t>2019/9/28</a:t>
+              <a:t>2019/10/7</a:t>
             </a:fld>
             <a:endParaRPr lang="zh-CN" altLang="en-US"/>
           </a:p>
@@ -665,7 +665,7 @@
           <a:p>
             <a:fld id="{3DD3760A-DE7A-43C9-AD8E-27ED0E105739}" type="datetimeFigureOut">
               <a:rPr lang="zh-CN" altLang="en-US" smtClean="0"/>
-              <a:t>2019/9/28</a:t>
+              <a:t>2019/10/7</a:t>
             </a:fld>
             <a:endParaRPr lang="zh-CN" altLang="en-US"/>
           </a:p>
@@ -863,7 +863,7 @@
           <a:p>
             <a:fld id="{3DD3760A-DE7A-43C9-AD8E-27ED0E105739}" type="datetimeFigureOut">
               <a:rPr lang="zh-CN" altLang="en-US" smtClean="0"/>
-              <a:t>2019/9/28</a:t>
+              <a:t>2019/10/7</a:t>
             </a:fld>
             <a:endParaRPr lang="zh-CN" altLang="en-US"/>
           </a:p>
@@ -1138,7 +1138,7 @@
           <a:p>
             <a:fld id="{3DD3760A-DE7A-43C9-AD8E-27ED0E105739}" type="datetimeFigureOut">
               <a:rPr lang="zh-CN" altLang="en-US" smtClean="0"/>
-              <a:t>2019/9/28</a:t>
+              <a:t>2019/10/7</a:t>
             </a:fld>
             <a:endParaRPr lang="zh-CN" altLang="en-US"/>
           </a:p>
@@ -1403,7 +1403,7 @@
           <a:p>
             <a:fld id="{3DD3760A-DE7A-43C9-AD8E-27ED0E105739}" type="datetimeFigureOut">
               <a:rPr lang="zh-CN" altLang="en-US" smtClean="0"/>
-              <a:t>2019/9/28</a:t>
+              <a:t>2019/10/7</a:t>
             </a:fld>
             <a:endParaRPr lang="zh-CN" altLang="en-US"/>
           </a:p>
@@ -1815,7 +1815,7 @@
           <a:p>
             <a:fld id="{3DD3760A-DE7A-43C9-AD8E-27ED0E105739}" type="datetimeFigureOut">
               <a:rPr lang="zh-CN" altLang="en-US" smtClean="0"/>
-              <a:t>2019/9/28</a:t>
+              <a:t>2019/10/7</a:t>
             </a:fld>
             <a:endParaRPr lang="zh-CN" altLang="en-US"/>
           </a:p>
@@ -1956,7 +1956,7 @@
           <a:p>
             <a:fld id="{3DD3760A-DE7A-43C9-AD8E-27ED0E105739}" type="datetimeFigureOut">
               <a:rPr lang="zh-CN" altLang="en-US" smtClean="0"/>
-              <a:t>2019/9/28</a:t>
+              <a:t>2019/10/7</a:t>
             </a:fld>
             <a:endParaRPr lang="zh-CN" altLang="en-US"/>
           </a:p>
@@ -2069,7 +2069,7 @@
           <a:p>
             <a:fld id="{3DD3760A-DE7A-43C9-AD8E-27ED0E105739}" type="datetimeFigureOut">
               <a:rPr lang="zh-CN" altLang="en-US" smtClean="0"/>
-              <a:t>2019/9/28</a:t>
+              <a:t>2019/10/7</a:t>
             </a:fld>
             <a:endParaRPr lang="zh-CN" altLang="en-US"/>
           </a:p>
@@ -2380,7 +2380,7 @@
           <a:p>
             <a:fld id="{3DD3760A-DE7A-43C9-AD8E-27ED0E105739}" type="datetimeFigureOut">
               <a:rPr lang="zh-CN" altLang="en-US" smtClean="0"/>
-              <a:t>2019/9/28</a:t>
+              <a:t>2019/10/7</a:t>
             </a:fld>
             <a:endParaRPr lang="zh-CN" altLang="en-US"/>
           </a:p>
@@ -2668,7 +2668,7 @@
           <a:p>
             <a:fld id="{3DD3760A-DE7A-43C9-AD8E-27ED0E105739}" type="datetimeFigureOut">
               <a:rPr lang="zh-CN" altLang="en-US" smtClean="0"/>
-              <a:t>2019/9/28</a:t>
+              <a:t>2019/10/7</a:t>
             </a:fld>
             <a:endParaRPr lang="zh-CN" altLang="en-US"/>
           </a:p>
@@ -2909,7 +2909,7 @@
           <a:p>
             <a:fld id="{3DD3760A-DE7A-43C9-AD8E-27ED0E105739}" type="datetimeFigureOut">
               <a:rPr lang="zh-CN" altLang="en-US" smtClean="0"/>
-              <a:t>2019/9/28</a:t>
+              <a:t>2019/10/7</a:t>
             </a:fld>
             <a:endParaRPr lang="zh-CN" altLang="en-US"/>
           </a:p>
@@ -3341,7 +3341,49 @@
         <p:spPr>
           <a:xfrm>
             <a:off x="3073400" y="796900"/>
-            <a:ext cx="1820334" cy="369332"/>
+            <a:ext cx="1090323" cy="369330"/>
+          </a:xfrm>
+          <a:prstGeom prst="rect">
+            <a:avLst/>
+          </a:prstGeom>
+          <a:noFill/>
+        </p:spPr>
+        <p:txBody>
+          <a:bodyPr wrap="square" rtlCol="0">
+            <a:spAutoFit/>
+          </a:bodyPr>
+          <a:lstStyle/>
+          <a:p>
+            <a:r>
+              <a:rPr lang="en-US" altLang="zh-CN" b="1" dirty="0" err="1">
+                <a:latin typeface="Times New Roman" panose="02020603050405020304" pitchFamily="18" charset="0"/>
+                <a:cs typeface="Times New Roman" panose="02020603050405020304" pitchFamily="18" charset="0"/>
+              </a:rPr>
+              <a:t>ELMo</a:t>
+            </a:r>
+            <a:endParaRPr lang="zh-CN" altLang="en-US" b="1" dirty="0">
+              <a:latin typeface="Times New Roman" panose="02020603050405020304" pitchFamily="18" charset="0"/>
+              <a:cs typeface="Times New Roman" panose="02020603050405020304" pitchFamily="18" charset="0"/>
+            </a:endParaRPr>
+          </a:p>
+        </p:txBody>
+      </p:sp>
+      <p:sp>
+        <p:nvSpPr>
+          <p:cNvPr id="6" name="文本框 5">
+            <a:extLst>
+              <a:ext uri="{FF2B5EF4-FFF2-40B4-BE49-F238E27FC236}">
+                <a16:creationId xmlns:a16="http://schemas.microsoft.com/office/drawing/2014/main" id="{AA5E2051-0049-48EF-BCDA-C9F05249D456}"/>
+              </a:ext>
+            </a:extLst>
+          </p:cNvPr>
+          <p:cNvSpPr txBox="1"/>
+          <p:nvPr/>
+        </p:nvSpPr>
+        <p:spPr>
+          <a:xfrm>
+            <a:off x="1282045" y="796900"/>
+            <a:ext cx="1090323" cy="369331"/>
           </a:xfrm>
           <a:prstGeom prst="rect">
             <a:avLst/>
@@ -3368,99 +3410,6 @@
           </a:p>
         </p:txBody>
       </p:sp>
-      <p:grpSp>
-        <p:nvGrpSpPr>
-          <p:cNvPr id="7" name="组合 6">
-            <a:extLst>
-              <a:ext uri="{FF2B5EF4-FFF2-40B4-BE49-F238E27FC236}">
-                <a16:creationId xmlns:a16="http://schemas.microsoft.com/office/drawing/2014/main" id="{F6A85FBD-9A7B-4FE0-918B-3958E6FF4298}"/>
-              </a:ext>
-            </a:extLst>
-          </p:cNvPr>
-          <p:cNvGrpSpPr/>
-          <p:nvPr/>
-        </p:nvGrpSpPr>
-        <p:grpSpPr>
-          <a:xfrm>
-            <a:off x="1486773" y="97366"/>
-            <a:ext cx="885595" cy="1068866"/>
-            <a:chOff x="2291106" y="112486"/>
-            <a:chExt cx="885595" cy="1068866"/>
-          </a:xfrm>
-        </p:grpSpPr>
-        <p:pic>
-          <p:nvPicPr>
-            <p:cNvPr id="4" name="图片 3">
-              <a:extLst>
-                <a:ext uri="{FF2B5EF4-FFF2-40B4-BE49-F238E27FC236}">
-                  <a16:creationId xmlns:a16="http://schemas.microsoft.com/office/drawing/2014/main" id="{40123508-0C8C-4985-9DC5-D080BE0D6226}"/>
-                </a:ext>
-              </a:extLst>
-            </p:cNvPr>
-            <p:cNvPicPr>
-              <a:picLocks noChangeAspect="1"/>
-            </p:cNvPicPr>
-            <p:nvPr/>
-          </p:nvPicPr>
-          <p:blipFill>
-            <a:blip r:embed="rId2"/>
-            <a:stretch>
-              <a:fillRect/>
-            </a:stretch>
-          </p:blipFill>
-          <p:spPr>
-            <a:xfrm>
-              <a:off x="2335143" y="112486"/>
-              <a:ext cx="797523" cy="699534"/>
-            </a:xfrm>
-            <a:prstGeom prst="rect">
-              <a:avLst/>
-            </a:prstGeom>
-          </p:spPr>
-        </p:pic>
-        <p:sp>
-          <p:nvSpPr>
-            <p:cNvPr id="6" name="文本框 5">
-              <a:extLst>
-                <a:ext uri="{FF2B5EF4-FFF2-40B4-BE49-F238E27FC236}">
-                  <a16:creationId xmlns:a16="http://schemas.microsoft.com/office/drawing/2014/main" id="{AA5E2051-0049-48EF-BCDA-C9F05249D456}"/>
-                </a:ext>
-              </a:extLst>
-            </p:cNvPr>
-            <p:cNvSpPr txBox="1"/>
-            <p:nvPr/>
-          </p:nvSpPr>
-          <p:spPr>
-            <a:xfrm>
-              <a:off x="2291106" y="812020"/>
-              <a:ext cx="885595" cy="369332"/>
-            </a:xfrm>
-            <a:prstGeom prst="rect">
-              <a:avLst/>
-            </a:prstGeom>
-            <a:noFill/>
-          </p:spPr>
-          <p:txBody>
-            <a:bodyPr wrap="square" rtlCol="0">
-              <a:spAutoFit/>
-            </a:bodyPr>
-            <a:lstStyle/>
-            <a:p>
-              <a:r>
-                <a:rPr lang="en-US" altLang="zh-CN" b="1" dirty="0" err="1">
-                  <a:latin typeface="Times New Roman" panose="02020603050405020304" pitchFamily="18" charset="0"/>
-                  <a:cs typeface="Times New Roman" panose="02020603050405020304" pitchFamily="18" charset="0"/>
-                </a:rPr>
-                <a:t>ELMo</a:t>
-              </a:r>
-              <a:endParaRPr lang="zh-CN" altLang="en-US" b="1" dirty="0">
-                <a:latin typeface="Times New Roman" panose="02020603050405020304" pitchFamily="18" charset="0"/>
-                <a:cs typeface="Times New Roman" panose="02020603050405020304" pitchFamily="18" charset="0"/>
-              </a:endParaRPr>
-            </a:p>
-          </p:txBody>
-        </p:sp>
-      </p:grpSp>
       <p:cxnSp>
         <p:nvCxnSpPr>
           <p:cNvPr id="9" name="直接连接符 8">
@@ -3478,9 +3427,9 @@
           <p:nvPr/>
         </p:nvCxnSpPr>
         <p:spPr>
-          <a:xfrm>
-            <a:off x="2372368" y="981566"/>
-            <a:ext cx="701032" cy="0"/>
+          <a:xfrm flipV="1">
+            <a:off x="2372368" y="981565"/>
+            <a:ext cx="701032" cy="1"/>
           </a:xfrm>
           <a:prstGeom prst="line">
             <a:avLst/>
@@ -3536,7 +3485,7 @@
             <p:nvPr/>
           </p:nvPicPr>
           <p:blipFill>
-            <a:blip r:embed="rId3"/>
+            <a:blip r:embed="rId2"/>
             <a:stretch>
               <a:fillRect/>
             </a:stretch>
@@ -3972,7 +3921,7 @@
             <p:nvPr/>
           </p:nvPicPr>
           <p:blipFill>
-            <a:blip r:embed="rId4"/>
+            <a:blip r:embed="rId3"/>
             <a:stretch>
               <a:fillRect/>
             </a:stretch>
@@ -4149,7 +4098,7 @@
             <p:nvPr/>
           </p:nvPicPr>
           <p:blipFill>
-            <a:blip r:embed="rId5"/>
+            <a:blip r:embed="rId4"/>
             <a:stretch>
               <a:fillRect/>
             </a:stretch>
@@ -5421,8 +5370,8 @@
           </a:p>
         </p:txBody>
       </p:sp>
-      <mc:AlternateContent xmlns:mc="http://schemas.openxmlformats.org/markup-compatibility/2006" xmlns:a14="http://schemas.microsoft.com/office/drawing/2010/main">
-        <mc:Choice Requires="a14">
+      <mc:AlternateContent xmlns:mc="http://schemas.openxmlformats.org/markup-compatibility/2006">
+        <mc:Choice xmlns:a14="http://schemas.microsoft.com/office/drawing/2010/main" Requires="a14">
           <p:sp>
             <p:nvSpPr>
               <p:cNvPr id="94" name="文本框 93">
@@ -5499,7 +5448,7 @@
             </p:txBody>
           </p:sp>
         </mc:Choice>
-        <mc:Fallback xmlns="">
+        <mc:Fallback>
           <p:sp>
             <p:nvSpPr>
               <p:cNvPr id="94" name="文本框 93">
@@ -5523,9 +5472,9 @@
                 <a:avLst/>
               </a:prstGeom>
               <a:blipFill>
-                <a:blip r:embed="rId6"/>
+                <a:blip r:embed="rId5"/>
                 <a:stretch>
-                  <a:fillRect t="-6667" b="-20000"/>
+                  <a:fillRect t="-8197" b="-24590"/>
                 </a:stretch>
               </a:blipFill>
             </p:spPr>
@@ -5534,7 +5483,7 @@
               <a:lstStyle/>
               <a:p>
                 <a:r>
-                  <a:rPr lang="en-US">
+                  <a:rPr lang="zh-CN" altLang="en-US">
                     <a:noFill/>
                   </a:rPr>
                   <a:t> </a:t>
@@ -5862,6 +5811,78 @@
           <p:nvPr/>
         </p:nvPicPr>
         <p:blipFill>
+          <a:blip r:embed="rId6"/>
+          <a:stretch>
+            <a:fillRect/>
+          </a:stretch>
+        </p:blipFill>
+        <p:spPr>
+          <a:xfrm>
+            <a:off x="10280887" y="4144671"/>
+            <a:ext cx="931332" cy="891581"/>
+          </a:xfrm>
+          <a:prstGeom prst="rect">
+            <a:avLst/>
+          </a:prstGeom>
+        </p:spPr>
+      </p:pic>
+      <p:sp>
+        <p:nvSpPr>
+          <p:cNvPr id="2" name="文本框 1">
+            <a:extLst>
+              <a:ext uri="{FF2B5EF4-FFF2-40B4-BE49-F238E27FC236}">
+                <a16:creationId xmlns:a16="http://schemas.microsoft.com/office/drawing/2014/main" id="{19BB2FCF-9087-4E65-BD0B-A0B6E84F3743}"/>
+              </a:ext>
+            </a:extLst>
+          </p:cNvPr>
+          <p:cNvSpPr txBox="1"/>
+          <p:nvPr/>
+        </p:nvSpPr>
+        <p:spPr>
+          <a:xfrm>
+            <a:off x="9278463" y="6585512"/>
+            <a:ext cx="3072666" cy="253916"/>
+          </a:xfrm>
+          <a:prstGeom prst="rect">
+            <a:avLst/>
+          </a:prstGeom>
+          <a:noFill/>
+        </p:spPr>
+        <p:txBody>
+          <a:bodyPr wrap="square" rtlCol="0">
+            <a:spAutoFit/>
+          </a:bodyPr>
+          <a:lstStyle/>
+          <a:p>
+            <a:r>
+              <a:rPr lang="en-US" altLang="zh-CN" sz="1050" dirty="0">
+                <a:latin typeface="Times New Roman" panose="02020603050405020304" pitchFamily="18" charset="0"/>
+                <a:cs typeface="Times New Roman" panose="02020603050405020304" pitchFamily="18" charset="0"/>
+              </a:rPr>
+              <a:t> By Xiaozhi Wang &amp; Zhengyan Zhang @THUNLP</a:t>
+            </a:r>
+            <a:endParaRPr lang="zh-CN" altLang="en-US" sz="1050" dirty="0">
+              <a:latin typeface="Times New Roman" panose="02020603050405020304" pitchFamily="18" charset="0"/>
+              <a:cs typeface="Times New Roman" panose="02020603050405020304" pitchFamily="18" charset="0"/>
+            </a:endParaRPr>
+          </a:p>
+        </p:txBody>
+      </p:sp>
+      <p:pic>
+        <p:nvPicPr>
+          <p:cNvPr id="17" name="图片 16">
+            <a:extLst>
+              <a:ext uri="{FF2B5EF4-FFF2-40B4-BE49-F238E27FC236}">
+                <a16:creationId xmlns:a16="http://schemas.microsoft.com/office/drawing/2014/main" id="{38BFA2DB-DC3D-401A-9E52-5D6D67B6C9E7}"/>
+              </a:ext>
+            </a:extLst>
+          </p:cNvPr>
+          <p:cNvPicPr>
+            <a:picLocks noChangeAspect="1"/>
+          </p:cNvPicPr>
+          <p:nvPr/>
+        </p:nvPicPr>
+        <p:blipFill>
           <a:blip r:embed="rId7"/>
           <a:stretch>
             <a:fillRect/>
@@ -5869,20 +5890,61 @@
         </p:blipFill>
         <p:spPr>
           <a:xfrm>
-            <a:off x="10280887" y="4144671"/>
-            <a:ext cx="931332" cy="891581"/>
+            <a:off x="3056774" y="120237"/>
+            <a:ext cx="802660" cy="710368"/>
           </a:xfrm>
           <a:prstGeom prst="rect">
             <a:avLst/>
           </a:prstGeom>
         </p:spPr>
       </p:pic>
-      <p:sp>
-        <p:nvSpPr>
-          <p:cNvPr id="2" name="文本框 1">
-            <a:extLst>
-              <a:ext uri="{FF2B5EF4-FFF2-40B4-BE49-F238E27FC236}">
-                <a16:creationId xmlns:a16="http://schemas.microsoft.com/office/drawing/2014/main" id="{19BB2FCF-9087-4E65-BD0B-A0B6E84F3743}"/>
+      <p:cxnSp>
+        <p:nvCxnSpPr>
+          <p:cNvPr id="22" name="直接箭头连接符 21">
+            <a:extLst>
+              <a:ext uri="{FF2B5EF4-FFF2-40B4-BE49-F238E27FC236}">
+                <a16:creationId xmlns:a16="http://schemas.microsoft.com/office/drawing/2014/main" id="{9FBF0004-7D16-4969-B0F9-8DD2B73D35C1}"/>
+              </a:ext>
+            </a:extLst>
+          </p:cNvPr>
+          <p:cNvCxnSpPr>
+            <a:stCxn id="6" idx="2"/>
+          </p:cNvCxnSpPr>
+          <p:nvPr/>
+        </p:nvCxnSpPr>
+        <p:spPr>
+          <a:xfrm flipH="1">
+            <a:off x="1827206" y="1166231"/>
+            <a:ext cx="1" cy="340913"/>
+          </a:xfrm>
+          <a:prstGeom prst="straightConnector1">
+            <a:avLst/>
+          </a:prstGeom>
+          <a:ln>
+            <a:tailEnd type="triangle"/>
+          </a:ln>
+        </p:spPr>
+        <p:style>
+          <a:lnRef idx="3">
+            <a:schemeClr val="accent1"/>
+          </a:lnRef>
+          <a:fillRef idx="0">
+            <a:schemeClr val="accent1"/>
+          </a:fillRef>
+          <a:effectRef idx="2">
+            <a:schemeClr val="accent1"/>
+          </a:effectRef>
+          <a:fontRef idx="minor">
+            <a:schemeClr val="tx1"/>
+          </a:fontRef>
+        </p:style>
+      </p:cxnSp>
+      <p:sp>
+        <p:nvSpPr>
+          <p:cNvPr id="71" name="文本框 70">
+            <a:extLst>
+              <a:ext uri="{FF2B5EF4-FFF2-40B4-BE49-F238E27FC236}">
+                <a16:creationId xmlns:a16="http://schemas.microsoft.com/office/drawing/2014/main" id="{38D463A2-8A43-4C60-9689-A8621AADA921}"/>
               </a:ext>
             </a:extLst>
           </p:cNvPr>
@@ -5891,8 +5953,8 @@
         </p:nvSpPr>
         <p:spPr>
           <a:xfrm>
-            <a:off x="9278463" y="6585512"/>
-            <a:ext cx="3072666" cy="253916"/>
+            <a:off x="1299330" y="1505946"/>
+            <a:ext cx="1090323" cy="369331"/>
           </a:xfrm>
           <a:prstGeom prst="rect">
             <a:avLst/>
@@ -5906,13 +5968,13 @@
           <a:lstStyle/>
           <a:p>
             <a:r>
-              <a:rPr lang="en-US" altLang="zh-CN" sz="1050" dirty="0">
+              <a:rPr lang="en-US" altLang="zh-CN" b="1" dirty="0" err="1">
                 <a:latin typeface="Times New Roman" panose="02020603050405020304" pitchFamily="18" charset="0"/>
                 <a:cs typeface="Times New Roman" panose="02020603050405020304" pitchFamily="18" charset="0"/>
               </a:rPr>
-              <a:t> By Xiaozhi Wang &amp; Zhengyan Zhang @THUNLP</a:t>
-            </a:r>
-            <a:endParaRPr lang="zh-CN" altLang="en-US" sz="1050" dirty="0">
+              <a:t>MultiFiT</a:t>
+            </a:r>
+            <a:endParaRPr lang="zh-CN" altLang="en-US" b="1" dirty="0">
               <a:latin typeface="Times New Roman" panose="02020603050405020304" pitchFamily="18" charset="0"/>
               <a:cs typeface="Times New Roman" panose="02020603050405020304" pitchFamily="18" charset="0"/>
             </a:endParaRPr>

</xml_diff>

<commit_message>
Add some earily work & reorganize the diagram
</commit_message>
<xml_diff>
--- a/PLMfamily.pptx
+++ b/PLMfamily.pptx
@@ -3340,7 +3340,7 @@
         </p:nvSpPr>
         <p:spPr>
           <a:xfrm>
-            <a:off x="3073400" y="796900"/>
+            <a:off x="3754069" y="1025701"/>
             <a:ext cx="1090323" cy="369330"/>
           </a:xfrm>
           <a:prstGeom prst="rect">
@@ -3382,7 +3382,7 @@
         </p:nvSpPr>
         <p:spPr>
           <a:xfrm>
-            <a:off x="1282045" y="796900"/>
+            <a:off x="2142259" y="1025700"/>
             <a:ext cx="1090323" cy="369331"/>
           </a:xfrm>
           <a:prstGeom prst="rect">
@@ -3427,9 +3427,9 @@
           <p:nvPr/>
         </p:nvCxnSpPr>
         <p:spPr>
-          <a:xfrm flipV="1">
-            <a:off x="2372368" y="981565"/>
-            <a:ext cx="701032" cy="1"/>
+          <a:xfrm>
+            <a:off x="3232582" y="1210366"/>
+            <a:ext cx="521487" cy="0"/>
           </a:xfrm>
           <a:prstGeom prst="line">
             <a:avLst/>
@@ -3464,7 +3464,7 @@
         </p:nvGrpSpPr>
         <p:grpSpPr>
           <a:xfrm>
-            <a:off x="5253898" y="1166232"/>
+            <a:off x="5253898" y="1420235"/>
             <a:ext cx="842102" cy="1324438"/>
             <a:chOff x="5253898" y="1166232"/>
             <a:chExt cx="842102" cy="1324438"/>
@@ -3559,8 +3559,8 @@
         </p:nvCxnSpPr>
         <p:spPr>
           <a:xfrm>
-            <a:off x="2722884" y="981566"/>
-            <a:ext cx="2441783" cy="855701"/>
+            <a:off x="3491925" y="1226808"/>
+            <a:ext cx="1672742" cy="864462"/>
           </a:xfrm>
           <a:prstGeom prst="straightConnector1">
             <a:avLst/>
@@ -3598,7 +3598,7 @@
         </p:nvSpPr>
         <p:spPr>
           <a:xfrm>
-            <a:off x="3932129" y="1166231"/>
+            <a:off x="4308885" y="1460525"/>
             <a:ext cx="1923209" cy="307777"/>
           </a:xfrm>
           <a:prstGeom prst="rect">
@@ -3640,7 +3640,7 @@
         </p:nvSpPr>
         <p:spPr>
           <a:xfrm>
-            <a:off x="7992534" y="950787"/>
+            <a:off x="7992534" y="1204790"/>
             <a:ext cx="668866" cy="369332"/>
           </a:xfrm>
           <a:prstGeom prst="rect">
@@ -3684,7 +3684,7 @@
         </p:nvCxnSpPr>
         <p:spPr>
           <a:xfrm flipH="1">
-            <a:off x="6155267" y="1320119"/>
+            <a:off x="6155267" y="1574122"/>
             <a:ext cx="2171700" cy="517148"/>
           </a:xfrm>
           <a:prstGeom prst="straightConnector1">
@@ -3723,7 +3723,7 @@
         </p:nvSpPr>
         <p:spPr>
           <a:xfrm>
-            <a:off x="6459429" y="1166231"/>
+            <a:off x="6248400" y="1512971"/>
             <a:ext cx="1684867" cy="307777"/>
           </a:xfrm>
           <a:prstGeom prst="rect">
@@ -3765,7 +3765,7 @@
         </p:nvSpPr>
         <p:spPr>
           <a:xfrm>
-            <a:off x="7861300" y="2306004"/>
+            <a:off x="7861300" y="2560007"/>
             <a:ext cx="931333" cy="369332"/>
           </a:xfrm>
           <a:prstGeom prst="rect">
@@ -3810,7 +3810,7 @@
         </p:nvCxnSpPr>
         <p:spPr>
           <a:xfrm>
-            <a:off x="8326967" y="1320119"/>
+            <a:off x="8326967" y="1574122"/>
             <a:ext cx="0" cy="985885"/>
           </a:xfrm>
           <a:prstGeom prst="straightConnector1">
@@ -3849,7 +3849,7 @@
         </p:nvSpPr>
         <p:spPr>
           <a:xfrm>
-            <a:off x="8326966" y="1498726"/>
+            <a:off x="8326966" y="1752729"/>
             <a:ext cx="1684867" cy="523220"/>
           </a:xfrm>
           <a:prstGeom prst="rect">
@@ -3900,7 +3900,7 @@
         </p:nvGrpSpPr>
         <p:grpSpPr>
           <a:xfrm>
-            <a:off x="10371805" y="1507144"/>
+            <a:off x="10371805" y="1761147"/>
             <a:ext cx="931333" cy="1172926"/>
             <a:chOff x="10371805" y="1507144"/>
             <a:chExt cx="931333" cy="1172926"/>
@@ -3996,7 +3996,7 @@
         </p:nvCxnSpPr>
         <p:spPr>
           <a:xfrm>
-            <a:off x="8792633" y="2490670"/>
+            <a:off x="8792633" y="2744673"/>
             <a:ext cx="1579172" cy="4734"/>
           </a:xfrm>
           <a:prstGeom prst="straightConnector1">
@@ -4035,7 +4035,7 @@
         </p:nvSpPr>
         <p:spPr>
           <a:xfrm>
-            <a:off x="9093480" y="2229675"/>
+            <a:off x="9093480" y="2483678"/>
             <a:ext cx="812660" cy="307777"/>
           </a:xfrm>
           <a:prstGeom prst="rect">
@@ -4077,7 +4077,7 @@
         </p:nvGrpSpPr>
         <p:grpSpPr>
           <a:xfrm>
-            <a:off x="5692733" y="4018167"/>
+            <a:off x="5692733" y="4272170"/>
             <a:ext cx="1159934" cy="1519714"/>
             <a:chOff x="4584699" y="3595200"/>
             <a:chExt cx="1159934" cy="1519714"/>
@@ -4184,7 +4184,7 @@
         </p:nvCxnSpPr>
         <p:spPr>
           <a:xfrm>
-            <a:off x="5807034" y="2490670"/>
+            <a:off x="5807034" y="2744673"/>
             <a:ext cx="465667" cy="1527497"/>
           </a:xfrm>
           <a:prstGeom prst="straightConnector1">
@@ -4223,7 +4223,7 @@
         </p:nvSpPr>
         <p:spPr>
           <a:xfrm>
-            <a:off x="9769162" y="4483246"/>
+            <a:off x="9769162" y="4737249"/>
             <a:ext cx="1964107" cy="1200329"/>
           </a:xfrm>
           <a:prstGeom prst="rect">
@@ -4297,7 +4297,7 @@
         </p:nvSpPr>
         <p:spPr>
           <a:xfrm>
-            <a:off x="5379613" y="3179578"/>
+            <a:off x="5413099" y="3535514"/>
             <a:ext cx="1773600" cy="307777"/>
           </a:xfrm>
           <a:prstGeom prst="rect">
@@ -4339,7 +4339,7 @@
         </p:nvSpPr>
         <p:spPr>
           <a:xfrm>
-            <a:off x="5630800" y="6140279"/>
+            <a:off x="5630800" y="6394282"/>
             <a:ext cx="1283800" cy="369332"/>
           </a:xfrm>
           <a:prstGeom prst="rect">
@@ -4385,7 +4385,7 @@
         </p:nvCxnSpPr>
         <p:spPr>
           <a:xfrm>
-            <a:off x="6272700" y="5537881"/>
+            <a:off x="6272700" y="5791884"/>
             <a:ext cx="0" cy="602398"/>
           </a:xfrm>
           <a:prstGeom prst="straightConnector1">
@@ -4424,7 +4424,7 @@
         </p:nvSpPr>
         <p:spPr>
           <a:xfrm>
-            <a:off x="6234545" y="5663225"/>
+            <a:off x="5676052" y="5891229"/>
             <a:ext cx="2180484" cy="307777"/>
           </a:xfrm>
           <a:prstGeom prst="rect">
@@ -4466,7 +4466,7 @@
         </p:nvSpPr>
         <p:spPr>
           <a:xfrm>
-            <a:off x="7606258" y="4070997"/>
+            <a:off x="7606258" y="4325000"/>
             <a:ext cx="1701331" cy="2585323"/>
           </a:xfrm>
           <a:prstGeom prst="rect">
@@ -4609,13 +4609,14 @@
           </p:cNvPr>
           <p:cNvCxnSpPr>
             <a:cxnSpLocks/>
+            <a:stCxn id="15" idx="3"/>
           </p:cNvCxnSpPr>
           <p:nvPr/>
         </p:nvCxnSpPr>
         <p:spPr>
           <a:xfrm>
-            <a:off x="5964933" y="2229675"/>
-            <a:ext cx="2450096" cy="1851258"/>
+            <a:off x="6060432" y="2560007"/>
+            <a:ext cx="2354597" cy="1774929"/>
           </a:xfrm>
           <a:prstGeom prst="straightConnector1">
             <a:avLst/>
@@ -4653,7 +4654,7 @@
         </p:nvSpPr>
         <p:spPr>
           <a:xfrm>
-            <a:off x="6970911" y="3205616"/>
+            <a:off x="6919490" y="3422774"/>
             <a:ext cx="1221865" cy="307777"/>
           </a:xfrm>
           <a:prstGeom prst="rect">
@@ -4695,7 +4696,7 @@
         </p:nvSpPr>
         <p:spPr>
           <a:xfrm>
-            <a:off x="4277650" y="5341362"/>
+            <a:off x="4277650" y="5595365"/>
             <a:ext cx="1159934" cy="369332"/>
           </a:xfrm>
           <a:prstGeom prst="rect">
@@ -4738,7 +4739,7 @@
         </p:nvSpPr>
         <p:spPr>
           <a:xfrm>
-            <a:off x="2357431" y="3580821"/>
+            <a:off x="2357431" y="3834824"/>
             <a:ext cx="1159934" cy="646331"/>
           </a:xfrm>
           <a:prstGeom prst="rect">
@@ -4791,7 +4792,7 @@
         </p:nvSpPr>
         <p:spPr>
           <a:xfrm>
-            <a:off x="223528" y="3015621"/>
+            <a:off x="223528" y="3269624"/>
             <a:ext cx="1159934" cy="646331"/>
           </a:xfrm>
           <a:prstGeom prst="rect">
@@ -4844,7 +4845,7 @@
         </p:nvSpPr>
         <p:spPr>
           <a:xfrm>
-            <a:off x="2745908" y="5691768"/>
+            <a:off x="2745908" y="5945771"/>
             <a:ext cx="1290597" cy="369332"/>
           </a:xfrm>
           <a:prstGeom prst="rect">
@@ -4890,7 +4891,7 @@
         </p:nvCxnSpPr>
         <p:spPr>
           <a:xfrm flipH="1">
-            <a:off x="4857617" y="2537452"/>
+            <a:off x="4857617" y="2791455"/>
             <a:ext cx="713450" cy="2803910"/>
           </a:xfrm>
           <a:prstGeom prst="straightConnector1">
@@ -4929,7 +4930,7 @@
         </p:nvSpPr>
         <p:spPr>
           <a:xfrm>
-            <a:off x="4578550" y="3606013"/>
+            <a:off x="4645565" y="3843685"/>
             <a:ext cx="1414867" cy="738664"/>
           </a:xfrm>
           <a:prstGeom prst="rect">
@@ -4985,14 +4986,13 @@
             </a:extLst>
           </p:cNvPr>
           <p:cNvCxnSpPr>
-            <a:stCxn id="15" idx="1"/>
-            <a:endCxn id="64" idx="0"/>
+            <a:cxnSpLocks/>
           </p:cNvCxnSpPr>
           <p:nvPr/>
         </p:nvCxnSpPr>
         <p:spPr>
           <a:xfrm flipH="1">
-            <a:off x="2937398" y="2306004"/>
+            <a:off x="2937398" y="2552427"/>
             <a:ext cx="2316500" cy="1274817"/>
           </a:xfrm>
           <a:prstGeom prst="straightConnector1">
@@ -5031,7 +5031,7 @@
         </p:nvSpPr>
         <p:spPr>
           <a:xfrm>
-            <a:off x="2925541" y="2819803"/>
+            <a:off x="3015491" y="3250869"/>
             <a:ext cx="1414867" cy="307777"/>
           </a:xfrm>
           <a:prstGeom prst="rect">
@@ -5076,8 +5076,8 @@
         </p:nvCxnSpPr>
         <p:spPr>
           <a:xfrm flipH="1">
-            <a:off x="3391207" y="2490670"/>
-            <a:ext cx="1980870" cy="3201098"/>
+            <a:off x="3391207" y="2767848"/>
+            <a:ext cx="1998948" cy="3177923"/>
           </a:xfrm>
           <a:prstGeom prst="straightConnector1">
             <a:avLst/>
@@ -5115,7 +5115,7 @@
         </p:nvSpPr>
         <p:spPr>
           <a:xfrm>
-            <a:off x="3130611" y="4655546"/>
+            <a:off x="3190506" y="4932387"/>
             <a:ext cx="1576082" cy="738664"/>
           </a:xfrm>
           <a:prstGeom prst="rect">
@@ -5177,7 +5177,7 @@
         </p:nvCxnSpPr>
         <p:spPr>
           <a:xfrm flipH="1">
-            <a:off x="803495" y="2021946"/>
+            <a:off x="803495" y="2275949"/>
             <a:ext cx="4423444" cy="993675"/>
           </a:xfrm>
           <a:prstGeom prst="straightConnector1">
@@ -5216,7 +5216,7 @@
         </p:nvSpPr>
         <p:spPr>
           <a:xfrm>
-            <a:off x="2349341" y="2184109"/>
+            <a:off x="2349341" y="2438112"/>
             <a:ext cx="1414867" cy="307777"/>
           </a:xfrm>
           <a:prstGeom prst="rect">
@@ -5258,7 +5258,7 @@
         </p:nvSpPr>
         <p:spPr>
           <a:xfrm>
-            <a:off x="1131448" y="3429000"/>
+            <a:off x="1131448" y="3683003"/>
             <a:ext cx="1159934" cy="369332"/>
           </a:xfrm>
           <a:prstGeom prst="rect">
@@ -5303,7 +5303,7 @@
         </p:nvCxnSpPr>
         <p:spPr>
           <a:xfrm flipH="1">
-            <a:off x="1711415" y="2143828"/>
+            <a:off x="1711415" y="2397831"/>
             <a:ext cx="3531007" cy="1285172"/>
           </a:xfrm>
           <a:prstGeom prst="straightConnector1">
@@ -5342,7 +5342,7 @@
         </p:nvSpPr>
         <p:spPr>
           <a:xfrm>
-            <a:off x="2523064" y="2583002"/>
+            <a:off x="2523396" y="2882151"/>
             <a:ext cx="1414867" cy="307777"/>
           </a:xfrm>
           <a:prstGeom prst="rect">
@@ -5370,8 +5370,8 @@
           </a:p>
         </p:txBody>
       </p:sp>
-      <mc:AlternateContent xmlns:mc="http://schemas.openxmlformats.org/markup-compatibility/2006" xmlns:a14="http://schemas.microsoft.com/office/drawing/2010/main">
-        <mc:Choice Requires="a14">
+      <mc:AlternateContent xmlns:mc="http://schemas.openxmlformats.org/markup-compatibility/2006">
+        <mc:Choice xmlns:a14="http://schemas.microsoft.com/office/drawing/2010/main" Requires="a14">
           <p:sp>
             <p:nvSpPr>
               <p:cNvPr id="94" name="文本框 93">
@@ -5386,7 +5386,7 @@
             </p:nvSpPr>
             <p:spPr>
               <a:xfrm>
-                <a:off x="933355" y="4520107"/>
+                <a:off x="933355" y="4774110"/>
                 <a:ext cx="1556119" cy="369332"/>
               </a:xfrm>
               <a:prstGeom prst="rect">
@@ -5448,7 +5448,7 @@
             </p:txBody>
           </p:sp>
         </mc:Choice>
-        <mc:Fallback xmlns="">
+        <mc:Fallback>
           <p:sp>
             <p:nvSpPr>
               <p:cNvPr id="94" name="文本框 93">
@@ -5465,7 +5465,7 @@
             </p:nvSpPr>
             <p:spPr>
               <a:xfrm>
-                <a:off x="933355" y="4520107"/>
+                <a:off x="933355" y="4774110"/>
                 <a:ext cx="1556119" cy="369332"/>
               </a:xfrm>
               <a:prstGeom prst="rect">
@@ -5510,7 +5510,7 @@
         </p:nvCxnSpPr>
         <p:spPr>
           <a:xfrm>
-            <a:off x="1711415" y="3798332"/>
+            <a:off x="1711415" y="4052335"/>
             <a:ext cx="0" cy="721775"/>
           </a:xfrm>
           <a:prstGeom prst="straightConnector1">
@@ -5549,7 +5549,7 @@
         </p:nvSpPr>
         <p:spPr>
           <a:xfrm>
-            <a:off x="771839" y="3978438"/>
+            <a:off x="778959" y="4202920"/>
             <a:ext cx="1892998" cy="307777"/>
           </a:xfrm>
           <a:prstGeom prst="rect">
@@ -5591,7 +5591,7 @@
         </p:nvSpPr>
         <p:spPr>
           <a:xfrm>
-            <a:off x="1470974" y="5507102"/>
+            <a:off x="1470974" y="5761105"/>
             <a:ext cx="1477404" cy="369332"/>
           </a:xfrm>
           <a:prstGeom prst="rect">
@@ -5637,7 +5637,7 @@
         </p:nvCxnSpPr>
         <p:spPr>
           <a:xfrm flipH="1">
-            <a:off x="2209676" y="2449255"/>
+            <a:off x="2209676" y="2703258"/>
             <a:ext cx="3087986" cy="3057847"/>
           </a:xfrm>
           <a:prstGeom prst="straightConnector1">
@@ -5676,7 +5676,7 @@
         </p:nvSpPr>
         <p:spPr>
           <a:xfrm>
-            <a:off x="2866201" y="4190612"/>
+            <a:off x="2884226" y="4450582"/>
             <a:ext cx="1576082" cy="523220"/>
           </a:xfrm>
           <a:prstGeom prst="rect">
@@ -5729,7 +5729,7 @@
         </p:nvCxnSpPr>
         <p:spPr>
           <a:xfrm>
-            <a:off x="5981124" y="2060398"/>
+            <a:off x="5981124" y="2314401"/>
             <a:ext cx="4390681" cy="2306933"/>
           </a:xfrm>
           <a:prstGeom prst="straightConnector1">
@@ -5768,7 +5768,7 @@
         </p:nvSpPr>
         <p:spPr>
           <a:xfrm>
-            <a:off x="8378785" y="3480288"/>
+            <a:off x="8444681" y="3763839"/>
             <a:ext cx="1964107" cy="307777"/>
           </a:xfrm>
           <a:prstGeom prst="rect">
@@ -5818,7 +5818,7 @@
         </p:blipFill>
         <p:spPr>
           <a:xfrm>
-            <a:off x="10280887" y="4144671"/>
+            <a:off x="10280887" y="4398674"/>
             <a:ext cx="931332" cy="891581"/>
           </a:xfrm>
           <a:prstGeom prst="rect">
@@ -5868,36 +5868,6 @@
           </a:p>
         </p:txBody>
       </p:sp>
-      <p:pic>
-        <p:nvPicPr>
-          <p:cNvPr id="17" name="图片 16">
-            <a:extLst>
-              <a:ext uri="{FF2B5EF4-FFF2-40B4-BE49-F238E27FC236}">
-                <a16:creationId xmlns:a16="http://schemas.microsoft.com/office/drawing/2014/main" id="{38BFA2DB-DC3D-401A-9E52-5D6D67B6C9E7}"/>
-              </a:ext>
-            </a:extLst>
-          </p:cNvPr>
-          <p:cNvPicPr>
-            <a:picLocks noChangeAspect="1"/>
-          </p:cNvPicPr>
-          <p:nvPr/>
-        </p:nvPicPr>
-        <p:blipFill>
-          <a:blip r:embed="rId7"/>
-          <a:stretch>
-            <a:fillRect/>
-          </a:stretch>
-        </p:blipFill>
-        <p:spPr>
-          <a:xfrm>
-            <a:off x="3056774" y="120237"/>
-            <a:ext cx="802660" cy="710368"/>
-          </a:xfrm>
-          <a:prstGeom prst="rect">
-            <a:avLst/>
-          </a:prstGeom>
-        </p:spPr>
-      </p:pic>
       <p:cxnSp>
         <p:nvCxnSpPr>
           <p:cNvPr id="22" name="直接箭头连接符 21">
@@ -5916,8 +5886,8 @@
         </p:nvCxnSpPr>
         <p:spPr>
           <a:xfrm flipH="1">
-            <a:off x="1823133" y="1166231"/>
-            <a:ext cx="4074" cy="535046"/>
+            <a:off x="2686061" y="1395031"/>
+            <a:ext cx="1360" cy="575683"/>
           </a:xfrm>
           <a:prstGeom prst="straightConnector1">
             <a:avLst/>
@@ -5955,7 +5925,7 @@
         </p:nvSpPr>
         <p:spPr>
           <a:xfrm>
-            <a:off x="1277971" y="1701277"/>
+            <a:off x="2140899" y="1970714"/>
             <a:ext cx="1090323" cy="369331"/>
           </a:xfrm>
           <a:prstGeom prst="rect">
@@ -5997,7 +5967,7 @@
         </p:nvSpPr>
         <p:spPr>
           <a:xfrm>
-            <a:off x="1308171" y="1253012"/>
+            <a:off x="2163214" y="1523979"/>
             <a:ext cx="1157755" cy="307777"/>
           </a:xfrm>
           <a:prstGeom prst="rect">
@@ -6039,8 +6009,8 @@
         </p:nvSpPr>
         <p:spPr>
           <a:xfrm>
-            <a:off x="1491412" y="280387"/>
-            <a:ext cx="1384434" cy="369332"/>
+            <a:off x="3549008" y="-84670"/>
+            <a:ext cx="4516051" cy="923330"/>
           </a:xfrm>
           <a:prstGeom prst="rect">
             <a:avLst/>
@@ -6053,42 +6023,219 @@
           </a:bodyPr>
           <a:lstStyle/>
           <a:p>
+            <a:pPr algn="ctr"/>
             <a:r>
               <a:rPr lang="en-US" altLang="zh-CN" b="1" dirty="0">
                 <a:latin typeface="Times New Roman" panose="02020603050405020304" pitchFamily="18" charset="0"/>
                 <a:cs typeface="Times New Roman" panose="02020603050405020304" pitchFamily="18" charset="0"/>
               </a:rPr>
-              <a:t>context2vec</a:t>
-            </a:r>
-            <a:endParaRPr lang="zh-CN" altLang="en-US" b="1" dirty="0">
-              <a:latin typeface="Times New Roman" panose="02020603050405020304" pitchFamily="18" charset="0"/>
-              <a:cs typeface="Times New Roman" panose="02020603050405020304" pitchFamily="18" charset="0"/>
-            </a:endParaRPr>
+              <a:t>Semi-supervised Sequence Learning</a:t>
+            </a:r>
+          </a:p>
+          <a:p>
+            <a:pPr algn="ctr"/>
+            <a:r>
+              <a:rPr lang="en-US" altLang="zh-CN" b="1" dirty="0">
+                <a:latin typeface="Times New Roman" panose="02020603050405020304" pitchFamily="18" charset="0"/>
+                <a:cs typeface="Times New Roman" panose="02020603050405020304" pitchFamily="18" charset="0"/>
+              </a:rPr>
+              <a:t>context2Vec</a:t>
+            </a:r>
+          </a:p>
+          <a:p>
+            <a:pPr algn="ctr"/>
+            <a:r>
+              <a:rPr lang="en-US" altLang="zh-CN" b="1" dirty="0">
+                <a:latin typeface="Times New Roman" panose="02020603050405020304" pitchFamily="18" charset="0"/>
+                <a:cs typeface="Times New Roman" panose="02020603050405020304" pitchFamily="18" charset="0"/>
+              </a:rPr>
+              <a:t>Pre-trained seq2seq</a:t>
+            </a:r>
           </a:p>
         </p:txBody>
       </p:sp>
       <p:cxnSp>
         <p:nvCxnSpPr>
-          <p:cNvPr id="77" name="直接连接符 8">
-            <a:extLst>
-              <a:ext uri="{FF2B5EF4-FFF2-40B4-BE49-F238E27FC236}">
-                <a16:creationId xmlns:a16="http://schemas.microsoft.com/office/drawing/2014/main" id="{018221F8-E3AA-8B40-9028-4F219665B6B2}"/>
+          <p:cNvPr id="4" name="直接箭头连接符 3">
+            <a:extLst>
+              <a:ext uri="{FF2B5EF4-FFF2-40B4-BE49-F238E27FC236}">
+                <a16:creationId xmlns:a16="http://schemas.microsoft.com/office/drawing/2014/main" id="{9E0241A7-AA7E-4800-A73A-FFE8A645891E}"/>
               </a:ext>
             </a:extLst>
           </p:cNvPr>
           <p:cNvCxnSpPr>
-            <a:cxnSpLocks/>
+            <a:stCxn id="73" idx="2"/>
+            <a:endCxn id="6" idx="0"/>
           </p:cNvCxnSpPr>
           <p:nvPr/>
         </p:nvCxnSpPr>
         <p:spPr>
-          <a:xfrm>
-            <a:off x="2291382" y="695885"/>
-            <a:ext cx="419284" cy="275728"/>
-          </a:xfrm>
-          <a:prstGeom prst="line">
+          <a:xfrm flipH="1">
+            <a:off x="2687421" y="838660"/>
+            <a:ext cx="3119613" cy="187040"/>
+          </a:xfrm>
+          <a:prstGeom prst="straightConnector1">
             <a:avLst/>
           </a:prstGeom>
+          <a:ln>
+            <a:tailEnd type="triangle"/>
+          </a:ln>
+        </p:spPr>
+        <p:style>
+          <a:lnRef idx="3">
+            <a:schemeClr val="accent1"/>
+          </a:lnRef>
+          <a:fillRef idx="0">
+            <a:schemeClr val="accent1"/>
+          </a:fillRef>
+          <a:effectRef idx="2">
+            <a:schemeClr val="accent1"/>
+          </a:effectRef>
+          <a:fontRef idx="minor">
+            <a:schemeClr val="tx1"/>
+          </a:fontRef>
+        </p:style>
+      </p:cxnSp>
+      <p:pic>
+        <p:nvPicPr>
+          <p:cNvPr id="17" name="图片 16">
+            <a:extLst>
+              <a:ext uri="{FF2B5EF4-FFF2-40B4-BE49-F238E27FC236}">
+                <a16:creationId xmlns:a16="http://schemas.microsoft.com/office/drawing/2014/main" id="{38BFA2DB-DC3D-401A-9E52-5D6D67B6C9E7}"/>
+              </a:ext>
+            </a:extLst>
+          </p:cNvPr>
+          <p:cNvPicPr>
+            <a:picLocks noChangeAspect="1"/>
+          </p:cNvPicPr>
+          <p:nvPr/>
+        </p:nvPicPr>
+        <p:blipFill>
+          <a:blip r:embed="rId7"/>
+          <a:stretch>
+            <a:fillRect/>
+          </a:stretch>
+        </p:blipFill>
+        <p:spPr>
+          <a:xfrm>
+            <a:off x="3737443" y="349038"/>
+            <a:ext cx="802660" cy="710368"/>
+          </a:xfrm>
+          <a:prstGeom prst="rect">
+            <a:avLst/>
+          </a:prstGeom>
+        </p:spPr>
+      </p:pic>
+      <p:cxnSp>
+        <p:nvCxnSpPr>
+          <p:cNvPr id="8" name="直接箭头连接符 7">
+            <a:extLst>
+              <a:ext uri="{FF2B5EF4-FFF2-40B4-BE49-F238E27FC236}">
+                <a16:creationId xmlns:a16="http://schemas.microsoft.com/office/drawing/2014/main" id="{D0EBC65C-7CD4-4F04-AFFB-3FF7688CEC3C}"/>
+              </a:ext>
+            </a:extLst>
+          </p:cNvPr>
+          <p:cNvCxnSpPr>
+            <a:cxnSpLocks/>
+            <a:stCxn id="73" idx="2"/>
+          </p:cNvCxnSpPr>
+          <p:nvPr/>
+        </p:nvCxnSpPr>
+        <p:spPr>
+          <a:xfrm flipH="1">
+            <a:off x="4615656" y="838660"/>
+            <a:ext cx="1191378" cy="265146"/>
+          </a:xfrm>
+          <a:prstGeom prst="straightConnector1">
+            <a:avLst/>
+          </a:prstGeom>
+          <a:ln>
+            <a:tailEnd type="triangle"/>
+          </a:ln>
+        </p:spPr>
+        <p:style>
+          <a:lnRef idx="3">
+            <a:schemeClr val="accent1"/>
+          </a:lnRef>
+          <a:fillRef idx="0">
+            <a:schemeClr val="accent1"/>
+          </a:fillRef>
+          <a:effectRef idx="2">
+            <a:schemeClr val="accent1"/>
+          </a:effectRef>
+          <a:fontRef idx="minor">
+            <a:schemeClr val="tx1"/>
+          </a:fontRef>
+        </p:style>
+      </p:cxnSp>
+      <p:cxnSp>
+        <p:nvCxnSpPr>
+          <p:cNvPr id="12" name="直接箭头连接符 11">
+            <a:extLst>
+              <a:ext uri="{FF2B5EF4-FFF2-40B4-BE49-F238E27FC236}">
+                <a16:creationId xmlns:a16="http://schemas.microsoft.com/office/drawing/2014/main" id="{82E6522C-6FFE-4CF8-B1E2-9BBBD34D5C7E}"/>
+              </a:ext>
+            </a:extLst>
+          </p:cNvPr>
+          <p:cNvCxnSpPr>
+            <a:cxnSpLocks/>
+            <a:stCxn id="73" idx="2"/>
+          </p:cNvCxnSpPr>
+          <p:nvPr/>
+        </p:nvCxnSpPr>
+        <p:spPr>
+          <a:xfrm>
+            <a:off x="5807034" y="838660"/>
+            <a:ext cx="0" cy="581573"/>
+          </a:xfrm>
+          <a:prstGeom prst="straightConnector1">
+            <a:avLst/>
+          </a:prstGeom>
+          <a:ln>
+            <a:tailEnd type="triangle"/>
+          </a:ln>
+        </p:spPr>
+        <p:style>
+          <a:lnRef idx="3">
+            <a:schemeClr val="accent1"/>
+          </a:lnRef>
+          <a:fillRef idx="0">
+            <a:schemeClr val="accent1"/>
+          </a:fillRef>
+          <a:effectRef idx="2">
+            <a:schemeClr val="accent1"/>
+          </a:effectRef>
+          <a:fontRef idx="minor">
+            <a:schemeClr val="tx1"/>
+          </a:fontRef>
+        </p:style>
+      </p:cxnSp>
+      <p:cxnSp>
+        <p:nvCxnSpPr>
+          <p:cNvPr id="14" name="直接箭头连接符 13">
+            <a:extLst>
+              <a:ext uri="{FF2B5EF4-FFF2-40B4-BE49-F238E27FC236}">
+                <a16:creationId xmlns:a16="http://schemas.microsoft.com/office/drawing/2014/main" id="{0F199CF8-C814-4F3F-B4C4-DEE0DBA9E243}"/>
+              </a:ext>
+            </a:extLst>
+          </p:cNvPr>
+          <p:cNvCxnSpPr>
+            <a:stCxn id="73" idx="2"/>
+            <a:endCxn id="21" idx="0"/>
+          </p:cNvCxnSpPr>
+          <p:nvPr/>
+        </p:nvCxnSpPr>
+        <p:spPr>
+          <a:xfrm>
+            <a:off x="5807034" y="838660"/>
+            <a:ext cx="2519933" cy="366130"/>
+          </a:xfrm>
+          <a:prstGeom prst="straightConnector1">
+            <a:avLst/>
+          </a:prstGeom>
+          <a:ln>
+            <a:tailEnd type="triangle"/>
+          </a:ln>
         </p:spPr>
         <p:style>
           <a:lnRef idx="3">

</xml_diff>